<commit_message>
updated according to sarita ma'am
</commit_message>
<xml_diff>
--- a/Presentation Aishwarya.pptx
+++ b/Presentation Aishwarya.pptx
@@ -3680,17 +3680,7 @@
                   </a:schemeClr>
                 </a:solidFill>
               </a:rPr>
-              <a:t>Presented By – Aishwarya </a:t>
-            </a:r>
-            <a:r>
-              <a:rPr lang="en-US" sz="2800" b="1" dirty="0" err="1" smtClean="0">
-                <a:solidFill>
-                  <a:schemeClr val="accent1">
-                    <a:lumMod val="75000"/>
-                  </a:schemeClr>
-                </a:solidFill>
-              </a:rPr>
-              <a:t>Sarna</a:t>
+              <a:t>Presented By – Aishwarya Sarna</a:t>
             </a:r>
             <a:endParaRPr lang="en-IN" sz="2800" b="1" dirty="0">
               <a:solidFill>
@@ -3807,18 +3797,6 @@
               </a:rPr>
               <a:t>Team Members – </a:t>
             </a:r>
-          </a:p>
-          <a:p>
-            <a:r>
-              <a:rPr lang="en-IN" dirty="0" err="1" smtClean="0">
-                <a:solidFill>
-                  <a:schemeClr val="accent1">
-                    <a:lumMod val="75000"/>
-                  </a:schemeClr>
-                </a:solidFill>
-              </a:rPr>
-              <a:t>Aditya</a:t>
-            </a:r>
             <a:endParaRPr lang="en-IN" dirty="0" smtClean="0">
               <a:solidFill>
                 <a:schemeClr val="accent1">
@@ -3829,14 +3807,14 @@
           </a:p>
           <a:p>
             <a:r>
-              <a:rPr lang="en-IN" dirty="0" err="1" smtClean="0">
+              <a:rPr lang="en-US" dirty="0" smtClean="0">
                 <a:solidFill>
                   <a:schemeClr val="accent1">
                     <a:lumMod val="75000"/>
                   </a:schemeClr>
                 </a:solidFill>
               </a:rPr>
-              <a:t>Ayush</a:t>
+              <a:t>Aishwarya Sarna</a:t>
             </a:r>
             <a:endParaRPr lang="en-IN" dirty="0" smtClean="0">
               <a:solidFill>
@@ -3848,15 +3826,24 @@
           </a:p>
           <a:p>
             <a:r>
-              <a:rPr lang="en-IN" dirty="0" err="1" smtClean="0">
+              <a:rPr lang="en-IN" dirty="0" smtClean="0">
                 <a:solidFill>
                   <a:schemeClr val="accent1">
                     <a:lumMod val="75000"/>
                   </a:schemeClr>
                 </a:solidFill>
               </a:rPr>
-              <a:t>Akash</a:t>
-            </a:r>
+              <a:t>Aditya Khatavkar</a:t>
+            </a:r>
+            <a:endParaRPr lang="en-IN" dirty="0" smtClean="0">
+              <a:solidFill>
+                <a:schemeClr val="accent1">
+                  <a:lumMod val="75000"/>
+                </a:schemeClr>
+              </a:solidFill>
+            </a:endParaRPr>
+          </a:p>
+          <a:p>
             <a:r>
               <a:rPr lang="en-IN" dirty="0" smtClean="0">
                 <a:solidFill>
@@ -3865,8 +3852,15 @@
                   </a:schemeClr>
                 </a:solidFill>
               </a:rPr>
-              <a:t> </a:t>
-            </a:r>
+              <a:t>Ayush Soni</a:t>
+            </a:r>
+            <a:endParaRPr lang="en-IN" dirty="0" smtClean="0">
+              <a:solidFill>
+                <a:schemeClr val="accent1">
+                  <a:lumMod val="75000"/>
+                </a:schemeClr>
+              </a:solidFill>
+            </a:endParaRPr>
           </a:p>
           <a:p>
             <a:r>
@@ -3877,7 +3871,26 @@
                   </a:schemeClr>
                 </a:solidFill>
               </a:rPr>
-              <a:t>Samanway</a:t>
+              <a:t>Akshay Tople</a:t>
+            </a:r>
+            <a:endParaRPr lang="en-IN" dirty="0" smtClean="0">
+              <a:solidFill>
+                <a:schemeClr val="accent1">
+                  <a:lumMod val="75000"/>
+                </a:schemeClr>
+              </a:solidFill>
+            </a:endParaRPr>
+          </a:p>
+          <a:p>
+            <a:r>
+              <a:rPr lang="en-IN" dirty="0" smtClean="0">
+                <a:solidFill>
+                  <a:schemeClr val="accent1">
+                    <a:lumMod val="75000"/>
+                  </a:schemeClr>
+                </a:solidFill>
+              </a:rPr>
+              <a:t>Samanway Sahoo</a:t>
             </a:r>
             <a:endParaRPr lang="en-IN" dirty="0">
               <a:solidFill>
@@ -3943,7 +3956,9 @@
           </a:xfrm>
         </p:spPr>
         <p:txBody>
-          <a:bodyPr/>
+          <a:bodyPr>
+            <a:normAutofit fontScale="90000"/>
+          </a:bodyPr>
           <a:lstStyle/>
           <a:p>
             <a:r>
@@ -3954,7 +3969,17 @@
                   </a:schemeClr>
                 </a:solidFill>
               </a:rPr>
-              <a:t>EPIC AND USER STORIES</a:t>
+              <a:t>EPIC AND USER </a:t>
+            </a:r>
+            <a:r>
+              <a:rPr lang="en-IN" b="1" dirty="0" smtClean="0">
+                <a:solidFill>
+                  <a:schemeClr val="accent1">
+                    <a:lumMod val="75000"/>
+                  </a:schemeClr>
+                </a:solidFill>
+              </a:rPr>
+              <a:t>STORIES OF PECUNIA</a:t>
             </a:r>
             <a:endParaRPr lang="en-IN" b="1" dirty="0"/>
           </a:p>
@@ -3986,32 +4011,37 @@
               <a:buNone/>
             </a:pPr>
             <a:r>
-              <a:rPr lang="en-IN" sz="2400" dirty="0" smtClean="0">
+              <a:rPr lang="en-IN" sz="2400" b="1" dirty="0" smtClean="0">
                 <a:solidFill>
                   <a:schemeClr val="accent1">
                     <a:lumMod val="75000"/>
                   </a:schemeClr>
                 </a:solidFill>
               </a:rPr>
-              <a:t>Epic – </a:t>
-            </a:r>
-          </a:p>
-          <a:p>
-            <a:pPr marL="0" indent="0">
-              <a:buNone/>
-            </a:pPr>
-            <a:r>
-              <a:rPr lang="en-IN" sz="2400" dirty="0" smtClean="0">
+              <a:t>Epic </a:t>
+            </a:r>
+            <a:r>
+              <a:rPr lang="en-IN" sz="2400" b="1" dirty="0" smtClean="0">
                 <a:solidFill>
                   <a:schemeClr val="accent1">
                     <a:lumMod val="75000"/>
                   </a:schemeClr>
                 </a:solidFill>
               </a:rPr>
-              <a:t>Developing Login Page for the bank Employee.</a:t>
-            </a:r>
-          </a:p>
-          <a:p>
+              <a:t>1 – </a:t>
+            </a:r>
+            <a:endParaRPr lang="en-IN" sz="2400" b="1" dirty="0" smtClean="0">
+              <a:solidFill>
+                <a:schemeClr val="accent1">
+                  <a:lumMod val="75000"/>
+                </a:schemeClr>
+              </a:solidFill>
+            </a:endParaRPr>
+          </a:p>
+          <a:p>
+            <a:pPr marL="0" indent="0">
+              <a:buNone/>
+            </a:pPr>
             <a:r>
               <a:rPr lang="en-IN" sz="2400" dirty="0" smtClean="0">
                 <a:solidFill>
@@ -4020,10 +4050,8 @@
                   </a:schemeClr>
                 </a:solidFill>
               </a:rPr>
-              <a:t>Design a log in dashboard where the employee will login to the system using his credentials.</a:t>
-            </a:r>
-          </a:p>
-          <a:p>
+              <a:t>Developing Login Page for the bank Employee</a:t>
+            </a:r>
             <a:r>
               <a:rPr lang="en-IN" sz="2400" dirty="0" smtClean="0">
                 <a:solidFill>
@@ -4032,25 +4060,32 @@
                   </a:schemeClr>
                 </a:solidFill>
               </a:rPr>
-              <a:t>A “signing in….” indicator will be shown to the user until he logs in, in case of delay.</a:t>
-            </a:r>
-          </a:p>
-          <a:p>
-            <a:r>
-              <a:rPr lang="en-IN" sz="2400" dirty="0" smtClean="0">
+              <a:t>.</a:t>
+            </a:r>
+          </a:p>
+          <a:p>
+            <a:pPr marL="0" indent="0">
+              <a:buNone/>
+            </a:pPr>
+            <a:r>
+              <a:rPr lang="en-US" sz="2400" dirty="0" smtClean="0">
                 <a:solidFill>
                   <a:schemeClr val="accent1">
                     <a:lumMod val="75000"/>
                   </a:schemeClr>
                 </a:solidFill>
               </a:rPr>
-              <a:t>Need of a database that can scale to accommodate all bank employees.</a:t>
-            </a:r>
-          </a:p>
-          <a:p>
-            <a:pPr marL="0" indent="0">
-              <a:buNone/>
-            </a:pPr>
+              <a:t>Description - </a:t>
+            </a:r>
+            <a:endParaRPr lang="en-IN" sz="2400" dirty="0" smtClean="0">
+              <a:solidFill>
+                <a:schemeClr val="accent1">
+                  <a:lumMod val="75000"/>
+                </a:schemeClr>
+              </a:solidFill>
+            </a:endParaRPr>
+          </a:p>
+          <a:p>
             <a:r>
               <a:rPr lang="en-IN" sz="2400" dirty="0" smtClean="0">
                 <a:solidFill>
@@ -4059,7 +4094,7 @@
                   </a:schemeClr>
                 </a:solidFill>
               </a:rPr>
-              <a:t>User Story-</a:t>
+              <a:t>Design a log in dashboard where the employee will login to the system using his credentials.</a:t>
             </a:r>
           </a:p>
           <a:p>
@@ -4071,24 +4106,67 @@
                   </a:schemeClr>
                 </a:solidFill>
               </a:rPr>
-              <a:t>As a bank employee if I type my credentials wrong by accident, I am presented with a pop up that says I need to provide my credentials correctly.</a:t>
-            </a:r>
-          </a:p>
-          <a:p>
-            <a:r>
-              <a:rPr lang="en-IN" sz="2400" dirty="0" smtClean="0">
+              <a:t>A “signing in….” indicator will be shown to the user until he logs in, in case of delay.</a:t>
+            </a:r>
+          </a:p>
+          <a:p>
+            <a:pPr marL="0" indent="0">
+              <a:buNone/>
+            </a:pPr>
+            <a:r>
+              <a:rPr lang="en-IN" sz="2400" b="1" dirty="0" smtClean="0">
                 <a:solidFill>
                   <a:schemeClr val="accent1">
                     <a:lumMod val="75000"/>
                   </a:schemeClr>
                 </a:solidFill>
               </a:rPr>
+              <a:t>User Stories -</a:t>
+            </a:r>
+            <a:endParaRPr lang="en-IN" sz="2400" b="1" dirty="0" smtClean="0">
+              <a:solidFill>
+                <a:schemeClr val="accent1">
+                  <a:lumMod val="75000"/>
+                </a:schemeClr>
+              </a:solidFill>
+            </a:endParaRPr>
+          </a:p>
+          <a:p>
+            <a:pPr marL="457200" indent="-457200">
+              <a:buFont typeface="+mj-lt"/>
+              <a:buAutoNum type="arabicPeriod"/>
+            </a:pPr>
+            <a:r>
+              <a:rPr lang="en-IN" sz="2400" dirty="0" smtClean="0">
+                <a:solidFill>
+                  <a:schemeClr val="accent1">
+                    <a:lumMod val="75000"/>
+                  </a:schemeClr>
+                </a:solidFill>
+              </a:rPr>
+              <a:t>As a bank employee if I type my credentials wrong by accident, I am presented with a pop up that says I need to provide my credentials correctly.</a:t>
+            </a:r>
+          </a:p>
+          <a:p>
+            <a:pPr marL="457200" indent="-457200">
+              <a:buFont typeface="+mj-lt"/>
+              <a:buAutoNum type="arabicPeriod"/>
+            </a:pPr>
+            <a:r>
+              <a:rPr lang="en-IN" sz="2400" dirty="0" smtClean="0">
+                <a:solidFill>
+                  <a:schemeClr val="accent1">
+                    <a:lumMod val="75000"/>
+                  </a:schemeClr>
+                </a:solidFill>
+              </a:rPr>
               <a:t>Given I am an employee that has successfully logged in, I want access to manage customers, transactions, loans, etc.</a:t>
             </a:r>
           </a:p>
           <a:p>
-            <a:pPr marL="0" indent="0">
-              <a:buNone/>
+            <a:pPr marL="457200" indent="-457200">
+              <a:buFont typeface="+mj-lt"/>
+              <a:buAutoNum type="arabicPeriod"/>
             </a:pPr>
             <a:endParaRPr lang="en-IN" sz="2400" dirty="0" smtClean="0">
               <a:solidFill>
@@ -4151,41 +4229,17 @@
       </p:grpSpPr>
       <p:sp>
         <p:nvSpPr>
-          <p:cNvPr id="2" name="Title 1"/>
-          <p:cNvSpPr>
-            <a:spLocks noGrp="1"/>
-          </p:cNvSpPr>
-          <p:nvPr>
-            <p:ph type="title"/>
+          <p:cNvPr id="3" name="Content Placeholder 2"/>
+          <p:cNvSpPr>
+            <a:spLocks noGrp="1"/>
+          </p:cNvSpPr>
+          <p:nvPr>
+            <p:ph idx="1"/>
           </p:nvPr>
         </p:nvSpPr>
         <p:spPr>
           <a:xfrm>
-            <a:off x="467544" y="0"/>
-            <a:ext cx="8229600" cy="908720"/>
-          </a:xfrm>
-        </p:spPr>
-        <p:txBody>
-          <a:bodyPr/>
-          <a:lstStyle/>
-          <a:p>
-            <a:endParaRPr lang="en-IN" dirty="0"/>
-          </a:p>
-        </p:txBody>
-      </p:sp>
-      <p:sp>
-        <p:nvSpPr>
-          <p:cNvPr id="3" name="Content Placeholder 2"/>
-          <p:cNvSpPr>
-            <a:spLocks noGrp="1"/>
-          </p:cNvSpPr>
-          <p:nvPr>
-            <p:ph idx="1"/>
-          </p:nvPr>
-        </p:nvSpPr>
-        <p:spPr>
-          <a:xfrm>
-            <a:off x="457200" y="620688"/>
+            <a:off x="539552" y="692696"/>
             <a:ext cx="8229600" cy="5616624"/>
           </a:xfrm>
         </p:spPr>
@@ -4199,32 +4253,37 @@
               <a:buNone/>
             </a:pPr>
             <a:r>
-              <a:rPr lang="en-IN" sz="2400" dirty="0" smtClean="0">
+              <a:rPr lang="en-IN" sz="2400" b="1" dirty="0" smtClean="0">
                 <a:solidFill>
                   <a:schemeClr val="accent1">
                     <a:lumMod val="75000"/>
                   </a:schemeClr>
                 </a:solidFill>
               </a:rPr>
-              <a:t>Epic –</a:t>
-            </a:r>
-          </a:p>
-          <a:p>
-            <a:pPr marL="0" indent="0">
-              <a:buNone/>
-            </a:pPr>
-            <a:r>
-              <a:rPr lang="en-IN" sz="2400" dirty="0" smtClean="0">
+              <a:t>Epic </a:t>
+            </a:r>
+            <a:r>
+              <a:rPr lang="en-IN" sz="2400" b="1" dirty="0" smtClean="0">
                 <a:solidFill>
                   <a:schemeClr val="accent1">
                     <a:lumMod val="75000"/>
                   </a:schemeClr>
                 </a:solidFill>
               </a:rPr>
-              <a:t>As a bank manager, I want to know the customer details.</a:t>
-            </a:r>
-          </a:p>
-          <a:p>
+              <a:t>2 –</a:t>
+            </a:r>
+            <a:endParaRPr lang="en-IN" sz="2400" b="1" dirty="0" smtClean="0">
+              <a:solidFill>
+                <a:schemeClr val="accent1">
+                  <a:lumMod val="75000"/>
+                </a:schemeClr>
+              </a:solidFill>
+            </a:endParaRPr>
+          </a:p>
+          <a:p>
+            <a:pPr marL="0" indent="0">
+              <a:buNone/>
+            </a:pPr>
             <a:r>
               <a:rPr lang="en-IN" sz="2400" dirty="0" smtClean="0">
                 <a:solidFill>
@@ -4233,10 +4292,8 @@
                   </a:schemeClr>
                 </a:solidFill>
               </a:rPr>
-              <a:t>Know the type of loan the customer has applied for</a:t>
-            </a:r>
-          </a:p>
-          <a:p>
+              <a:t>As a bank manager, I want </a:t>
+            </a:r>
             <a:r>
               <a:rPr lang="en-IN" sz="2400" dirty="0" smtClean="0">
                 <a:solidFill>
@@ -4245,37 +4302,46 @@
                   </a:schemeClr>
                 </a:solidFill>
               </a:rPr>
-              <a:t>Calculate the amount of loan</a:t>
-            </a:r>
-          </a:p>
-          <a:p>
-            <a:r>
-              <a:rPr lang="en-IN" sz="2400" dirty="0" smtClean="0">
+              <a:t>to view customer details to approve loan.</a:t>
+            </a:r>
+            <a:endParaRPr lang="en-IN" sz="2400" dirty="0" smtClean="0">
+              <a:solidFill>
+                <a:schemeClr val="accent1">
+                  <a:lumMod val="75000"/>
+                </a:schemeClr>
+              </a:solidFill>
+            </a:endParaRPr>
+          </a:p>
+          <a:p>
+            <a:pPr marL="0" indent="0">
+              <a:buNone/>
+            </a:pPr>
+            <a:r>
+              <a:rPr lang="en-IN" sz="2400" b="1" dirty="0" smtClean="0">
                 <a:solidFill>
                   <a:schemeClr val="accent1">
                     <a:lumMod val="75000"/>
                   </a:schemeClr>
                 </a:solidFill>
               </a:rPr>
-              <a:t>Approve loan</a:t>
-            </a:r>
-          </a:p>
-          <a:p>
-            <a:pPr marL="0" indent="0">
-              <a:buNone/>
-            </a:pPr>
-            <a:r>
-              <a:rPr lang="en-IN" sz="2400" dirty="0" smtClean="0">
+              <a:t>User Stories </a:t>
+            </a:r>
+            <a:r>
+              <a:rPr lang="en-IN" sz="2400" b="1" dirty="0" smtClean="0">
                 <a:solidFill>
                   <a:schemeClr val="accent1">
                     <a:lumMod val="75000"/>
                   </a:schemeClr>
                 </a:solidFill>
               </a:rPr>
-              <a:t>User Story –</a:t>
-            </a:r>
-          </a:p>
-          <a:p>
+              <a:t>–</a:t>
+            </a:r>
+          </a:p>
+          <a:p>
+            <a:pPr marL="457200" indent="-457200">
+              <a:buFont typeface="+mj-lt"/>
+              <a:buAutoNum type="arabicPeriod"/>
+            </a:pPr>
             <a:r>
               <a:rPr lang="en-IN" sz="2400" dirty="0" smtClean="0">
                 <a:solidFill>
@@ -4288,6 +4354,10 @@
             </a:r>
           </a:p>
           <a:p>
+            <a:pPr marL="457200" indent="-457200">
+              <a:buFont typeface="+mj-lt"/>
+              <a:buAutoNum type="arabicPeriod"/>
+            </a:pPr>
             <a:r>
               <a:rPr lang="en-IN" sz="2400" dirty="0" smtClean="0">
                 <a:solidFill>
@@ -4300,6 +4370,10 @@
             </a:r>
           </a:p>
           <a:p>
+            <a:pPr marL="457200" indent="-457200">
+              <a:buFont typeface="+mj-lt"/>
+              <a:buAutoNum type="arabicPeriod"/>
+            </a:pPr>
             <a:r>
               <a:rPr lang="en-IN" sz="2400" dirty="0" smtClean="0">
                 <a:solidFill>
@@ -4312,6 +4386,10 @@
             </a:r>
           </a:p>
           <a:p>
+            <a:pPr marL="457200" indent="-457200">
+              <a:buFont typeface="+mj-lt"/>
+              <a:buAutoNum type="arabicPeriod"/>
+            </a:pPr>
             <a:r>
               <a:rPr lang="en-IN" sz="2400" dirty="0" smtClean="0">
                 <a:solidFill>
@@ -4429,7 +4507,17 @@
                   </a:schemeClr>
                 </a:solidFill>
               </a:rPr>
-              <a:t>USE CASE DIAGRAM</a:t>
+              <a:t>USE CASE </a:t>
+            </a:r>
+            <a:r>
+              <a:rPr lang="en-IN" b="1" dirty="0" smtClean="0">
+                <a:solidFill>
+                  <a:schemeClr val="accent1">
+                    <a:lumMod val="75000"/>
+                  </a:schemeClr>
+                </a:solidFill>
+              </a:rPr>
+              <a:t>DIAGRAM OF PECUNIA</a:t>
             </a:r>
             <a:endParaRPr lang="en-IN" b="1" dirty="0">
               <a:solidFill>
@@ -4528,11 +4616,13 @@
         <p:spPr>
           <a:xfrm>
             <a:off x="457200" y="0"/>
-            <a:ext cx="8229600" cy="908720"/>
+            <a:ext cx="8229600" cy="1124744"/>
           </a:xfrm>
         </p:spPr>
         <p:txBody>
-          <a:bodyPr/>
+          <a:bodyPr>
+            <a:normAutofit fontScale="90000"/>
+          </a:bodyPr>
           <a:lstStyle/>
           <a:p>
             <a:r>
@@ -4543,7 +4633,17 @@
                   </a:schemeClr>
                 </a:solidFill>
               </a:rPr>
-              <a:t>CLASS DIAGRAM</a:t>
+              <a:t>CLASS </a:t>
+            </a:r>
+            <a:r>
+              <a:rPr lang="en-IN" b="1" dirty="0" smtClean="0">
+                <a:solidFill>
+                  <a:schemeClr val="accent1">
+                    <a:lumMod val="75000"/>
+                  </a:schemeClr>
+                </a:solidFill>
+              </a:rPr>
+              <a:t>DIAGRAM OF ADMIN AND EMPLOYEE</a:t>
             </a:r>
             <a:endParaRPr lang="en-IN" b="1" dirty="0">
               <a:solidFill>
@@ -4822,7 +4922,17 @@
                   </a:schemeClr>
                 </a:solidFill>
               </a:rPr>
-              <a:t>SEQUENCE DIAGRAM</a:t>
+              <a:t>SEQUENCE </a:t>
+            </a:r>
+            <a:r>
+              <a:rPr lang="en-IN" b="1" dirty="0" smtClean="0">
+                <a:solidFill>
+                  <a:schemeClr val="accent1">
+                    <a:lumMod val="75000"/>
+                  </a:schemeClr>
+                </a:solidFill>
+              </a:rPr>
+              <a:t>DIAGRAM OF ADMIN</a:t>
             </a:r>
             <a:endParaRPr lang="en-IN" b="1" dirty="0">
               <a:solidFill>
@@ -4964,6 +5074,52 @@
           </a:ln>
         </p:spPr>
       </p:pic>
+      <p:sp>
+        <p:nvSpPr>
+          <p:cNvPr id="3" name="TextBox 2"/>
+          <p:cNvSpPr txBox="1"/>
+          <p:nvPr/>
+        </p:nvSpPr>
+        <p:spPr>
+          <a:xfrm>
+            <a:off x="462880" y="76697"/>
+            <a:ext cx="8686800" cy="769441"/>
+          </a:xfrm>
+          <a:prstGeom prst="rect">
+            <a:avLst/>
+          </a:prstGeom>
+          <a:noFill/>
+        </p:spPr>
+        <p:txBody>
+          <a:bodyPr wrap="square" rtlCol="0">
+            <a:spAutoFit/>
+          </a:bodyPr>
+          <a:lstStyle/>
+          <a:p>
+            <a:r>
+              <a:rPr lang="en-IN" sz="4400" b="1" dirty="0">
+                <a:solidFill>
+                  <a:schemeClr val="accent1">
+                    <a:lumMod val="75000"/>
+                  </a:schemeClr>
+                </a:solidFill>
+              </a:rPr>
+              <a:t>SEQUENCE DIAGRAM OF </a:t>
+            </a:r>
+            <a:r>
+              <a:rPr lang="en-IN" sz="4400" b="1" dirty="0" smtClean="0">
+                <a:solidFill>
+                  <a:schemeClr val="accent1">
+                    <a:lumMod val="75000"/>
+                  </a:schemeClr>
+                </a:solidFill>
+              </a:rPr>
+              <a:t>EMPLOYEE</a:t>
+            </a:r>
+            <a:endParaRPr lang="en-IN" sz="4400" dirty="0"/>
+          </a:p>
+        </p:txBody>
+      </p:sp>
     </p:spTree>
     <p:extLst>
       <p:ext uri="{BB962C8B-B14F-4D97-AF65-F5344CB8AC3E}">
@@ -5001,25 +5157,6 @@
           <a:chExt cx="0" cy="0"/>
         </a:xfrm>
       </p:grpSpPr>
-      <p:sp>
-        <p:nvSpPr>
-          <p:cNvPr id="2" name="Title 1"/>
-          <p:cNvSpPr>
-            <a:spLocks noGrp="1"/>
-          </p:cNvSpPr>
-          <p:nvPr>
-            <p:ph type="title"/>
-          </p:nvPr>
-        </p:nvSpPr>
-        <p:spPr/>
-        <p:txBody>
-          <a:bodyPr/>
-          <a:lstStyle/>
-          <a:p>
-            <a:endParaRPr lang="en-IN"/>
-          </a:p>
-        </p:txBody>
-      </p:sp>
       <p:sp>
         <p:nvSpPr>
           <p:cNvPr id="3" name="Content Placeholder 2"/>

</xml_diff>